<commit_message>
Minor changes for testing previously crashing unit test
</commit_message>
<xml_diff>
--- a/vignettes/RAPoverview.pptx
+++ b/vignettes/RAPoverview.pptx
@@ -255,7 +255,7 @@
           <a:p>
             <a:fld id="{9FABA390-D603-4FE1-BC20-34078821C5FB}" type="datetimeFigureOut">
               <a:rPr lang="en-GB" smtClean="0"/>
-              <a:t>27/03/2018</a:t>
+              <a:t>29/03/2018</a:t>
             </a:fld>
             <a:endParaRPr lang="en-GB"/>
           </a:p>
@@ -425,7 +425,7 @@
           <a:p>
             <a:fld id="{9FABA390-D603-4FE1-BC20-34078821C5FB}" type="datetimeFigureOut">
               <a:rPr lang="en-GB" smtClean="0"/>
-              <a:t>27/03/2018</a:t>
+              <a:t>29/03/2018</a:t>
             </a:fld>
             <a:endParaRPr lang="en-GB"/>
           </a:p>
@@ -605,7 +605,7 @@
           <a:p>
             <a:fld id="{9FABA390-D603-4FE1-BC20-34078821C5FB}" type="datetimeFigureOut">
               <a:rPr lang="en-GB" smtClean="0"/>
-              <a:t>27/03/2018</a:t>
+              <a:t>29/03/2018</a:t>
             </a:fld>
             <a:endParaRPr lang="en-GB"/>
           </a:p>
@@ -775,7 +775,7 @@
           <a:p>
             <a:fld id="{9FABA390-D603-4FE1-BC20-34078821C5FB}" type="datetimeFigureOut">
               <a:rPr lang="en-GB" smtClean="0"/>
-              <a:t>27/03/2018</a:t>
+              <a:t>29/03/2018</a:t>
             </a:fld>
             <a:endParaRPr lang="en-GB"/>
           </a:p>
@@ -1021,7 +1021,7 @@
           <a:p>
             <a:fld id="{9FABA390-D603-4FE1-BC20-34078821C5FB}" type="datetimeFigureOut">
               <a:rPr lang="en-GB" smtClean="0"/>
-              <a:t>27/03/2018</a:t>
+              <a:t>29/03/2018</a:t>
             </a:fld>
             <a:endParaRPr lang="en-GB"/>
           </a:p>
@@ -1253,7 +1253,7 @@
           <a:p>
             <a:fld id="{9FABA390-D603-4FE1-BC20-34078821C5FB}" type="datetimeFigureOut">
               <a:rPr lang="en-GB" smtClean="0"/>
-              <a:t>27/03/2018</a:t>
+              <a:t>29/03/2018</a:t>
             </a:fld>
             <a:endParaRPr lang="en-GB"/>
           </a:p>
@@ -1620,7 +1620,7 @@
           <a:p>
             <a:fld id="{9FABA390-D603-4FE1-BC20-34078821C5FB}" type="datetimeFigureOut">
               <a:rPr lang="en-GB" smtClean="0"/>
-              <a:t>27/03/2018</a:t>
+              <a:t>29/03/2018</a:t>
             </a:fld>
             <a:endParaRPr lang="en-GB"/>
           </a:p>
@@ -1738,7 +1738,7 @@
           <a:p>
             <a:fld id="{9FABA390-D603-4FE1-BC20-34078821C5FB}" type="datetimeFigureOut">
               <a:rPr lang="en-GB" smtClean="0"/>
-              <a:t>27/03/2018</a:t>
+              <a:t>29/03/2018</a:t>
             </a:fld>
             <a:endParaRPr lang="en-GB"/>
           </a:p>
@@ -1833,7 +1833,7 @@
           <a:p>
             <a:fld id="{9FABA390-D603-4FE1-BC20-34078821C5FB}" type="datetimeFigureOut">
               <a:rPr lang="en-GB" smtClean="0"/>
-              <a:t>27/03/2018</a:t>
+              <a:t>29/03/2018</a:t>
             </a:fld>
             <a:endParaRPr lang="en-GB"/>
           </a:p>
@@ -2110,7 +2110,7 @@
           <a:p>
             <a:fld id="{9FABA390-D603-4FE1-BC20-34078821C5FB}" type="datetimeFigureOut">
               <a:rPr lang="en-GB" smtClean="0"/>
-              <a:t>27/03/2018</a:t>
+              <a:t>29/03/2018</a:t>
             </a:fld>
             <a:endParaRPr lang="en-GB"/>
           </a:p>
@@ -2363,7 +2363,7 @@
           <a:p>
             <a:fld id="{9FABA390-D603-4FE1-BC20-34078821C5FB}" type="datetimeFigureOut">
               <a:rPr lang="en-GB" smtClean="0"/>
-              <a:t>27/03/2018</a:t>
+              <a:t>29/03/2018</a:t>
             </a:fld>
             <a:endParaRPr lang="en-GB"/>
           </a:p>
@@ -2576,7 +2576,7 @@
           <a:p>
             <a:fld id="{9FABA390-D603-4FE1-BC20-34078821C5FB}" type="datetimeFigureOut">
               <a:rPr lang="en-GB" smtClean="0"/>
-              <a:t>27/03/2018</a:t>
+              <a:t>29/03/2018</a:t>
             </a:fld>
             <a:endParaRPr lang="en-GB"/>
           </a:p>
@@ -4486,15 +4486,7 @@
             </a:pPr>
             <a:r>
               <a:rPr lang="en-GB" sz="1400" dirty="0" smtClean="0"/>
-              <a:t>Window </a:t>
-            </a:r>
-            <a:r>
-              <a:rPr lang="en-GB" sz="1400" dirty="0" smtClean="0"/>
-              <a:t>and </a:t>
-            </a:r>
-            <a:r>
-              <a:rPr lang="en-GB" sz="1400" dirty="0" smtClean="0"/>
-              <a:t>threshold for peaks can be modified</a:t>
+              <a:t>Window and threshold for peaks can be modified</a:t>
             </a:r>
           </a:p>
         </p:txBody>
@@ -5254,23 +5246,7 @@
             </a:r>
             <a:r>
               <a:rPr lang="en-GB" sz="1400" dirty="0" smtClean="0"/>
-              <a:t> </a:t>
-            </a:r>
-            <a:r>
-              <a:rPr lang="en-GB" sz="1400" dirty="0" smtClean="0"/>
-              <a:t>– outlier detection for </a:t>
-            </a:r>
-            <a:r>
-              <a:rPr lang="en-GB" sz="1400" dirty="0" smtClean="0"/>
-              <a:t>residuals </a:t>
-            </a:r>
-            <a:r>
-              <a:rPr lang="en-GB" sz="1400" dirty="0" smtClean="0"/>
-              <a:t>in objects of class </a:t>
-            </a:r>
-            <a:r>
-              <a:rPr lang="en-GB" sz="1400" dirty="0" smtClean="0"/>
-              <a:t>SSA</a:t>
+              <a:t> – outlier detection for residuals in objects of class SSA</a:t>
             </a:r>
           </a:p>
           <a:p>
@@ -5902,11 +5878,7 @@
           <a:p>
             <a:r>
               <a:rPr lang="en-GB" sz="1400" dirty="0" smtClean="0"/>
-              <a:t>Naming the package. RAP is taken on CRAN</a:t>
-            </a:r>
-            <a:r>
-              <a:rPr lang="en-GB" sz="1400" dirty="0" smtClean="0"/>
-              <a:t>. – suggestions: BMSP, </a:t>
+              <a:t>Naming the package. RAP is taken on CRAN. – suggestions: BMSP, </a:t>
             </a:r>
             <a:r>
               <a:rPr lang="en-GB" sz="1400" dirty="0" err="1" smtClean="0"/>
@@ -5943,11 +5915,7 @@
             </a:r>
             <a:r>
               <a:rPr lang="en-GB" sz="1400" dirty="0" smtClean="0"/>
-              <a:t>. Should we get more unity here</a:t>
-            </a:r>
-            <a:r>
-              <a:rPr lang="en-GB" sz="1400" dirty="0" smtClean="0"/>
-              <a:t>?</a:t>
+              <a:t>. Should we get more unity here?</a:t>
             </a:r>
           </a:p>
           <a:p>
@@ -5955,7 +5923,6 @@
               <a:rPr lang="en-GB" sz="1400" dirty="0" smtClean="0"/>
               <a:t>Is the metadata complete as it is now or should more items be added – suggestions: altitude</a:t>
             </a:r>
-            <a:endParaRPr lang="en-GB" sz="1400" dirty="0" smtClean="0"/>
           </a:p>
           <a:p>
             <a:endParaRPr lang="en-GB" sz="1400" dirty="0"/>
@@ -5980,15 +5947,7 @@
             </a:r>
             <a:r>
               <a:rPr lang="en-GB" sz="1400" dirty="0" smtClean="0"/>
-              <a:t> </a:t>
-            </a:r>
-            <a:r>
-              <a:rPr lang="en-GB" sz="1400" dirty="0" smtClean="0"/>
-              <a:t>modelling </a:t>
-            </a:r>
-            <a:r>
-              <a:rPr lang="en-GB" sz="1400" dirty="0" smtClean="0"/>
-              <a:t>is done now, only fitting a model with genotype fixed gives different results from fitting models for genotype fixed and random in the same function call. This has to do with starting values from the random model being used in the fixed model. Is this the desired behaviour?</a:t>
+              <a:t> modelling is done now, only fitting a model with genotype fixed gives different results from fitting models for genotype fixed and random in the same function call. This has to do with starting values from the random model being used in the fixed model. Is this the desired behaviour?</a:t>
             </a:r>
           </a:p>
           <a:p>
@@ -6002,15 +5961,7 @@
             </a:r>
             <a:r>
               <a:rPr lang="en-GB" sz="1400" dirty="0" smtClean="0"/>
-              <a:t> for some of the models fitted the residual variance is fixed at “almost zero”. The value of this “almost zero” is currently 10^-</a:t>
-            </a:r>
-            <a:r>
-              <a:rPr lang="en-GB" sz="1400" dirty="0" smtClean="0"/>
-              <a:t>4 in one place and 10^-3 in another </a:t>
-            </a:r>
-            <a:r>
-              <a:rPr lang="en-GB" sz="1400" dirty="0" smtClean="0"/>
-              <a:t>but this is quite random. How can we improve this?</a:t>
+              <a:t> for some of the models fitted the residual variance is fixed at “almost zero”. The value of this “almost zero” is currently 10^-4 in one place and 10^-3 in another but this is quite random. How can we improve this?</a:t>
             </a:r>
           </a:p>
           <a:p>
@@ -6024,11 +5975,7 @@
             </a:r>
             <a:r>
               <a:rPr lang="en-GB" sz="1400" dirty="0" smtClean="0"/>
-              <a:t> and if so what is its use</a:t>
-            </a:r>
-            <a:r>
-              <a:rPr lang="en-GB" sz="1400" dirty="0" smtClean="0"/>
-              <a:t>?</a:t>
+              <a:t> and if so what is its use?</a:t>
             </a:r>
           </a:p>
           <a:p>
@@ -6232,6 +6179,40 @@
           <a:chExt cx="0" cy="0"/>
         </a:xfrm>
       </p:grpSpPr>
+      <p:cxnSp>
+        <p:nvCxnSpPr>
+          <p:cNvPr id="3" name="Straight Arrow Connector 2"/>
+          <p:cNvCxnSpPr/>
+          <p:nvPr/>
+        </p:nvCxnSpPr>
+        <p:spPr>
+          <a:xfrm flipH="1">
+            <a:off x="3466407" y="2683820"/>
+            <a:ext cx="581891" cy="1273044"/>
+          </a:xfrm>
+          <a:prstGeom prst="straightConnector1">
+            <a:avLst/>
+          </a:prstGeom>
+          <a:ln>
+            <a:headEnd type="triangle"/>
+            <a:tailEnd type="triangle"/>
+          </a:ln>
+        </p:spPr>
+        <p:style>
+          <a:lnRef idx="1">
+            <a:schemeClr val="dk1"/>
+          </a:lnRef>
+          <a:fillRef idx="0">
+            <a:schemeClr val="dk1"/>
+          </a:fillRef>
+          <a:effectRef idx="0">
+            <a:schemeClr val="dk1"/>
+          </a:effectRef>
+          <a:fontRef idx="minor">
+            <a:schemeClr val="tx1"/>
+          </a:fontRef>
+        </p:style>
+      </p:cxnSp>
       <p:sp>
         <p:nvSpPr>
           <p:cNvPr id="4" name="Rectangle 3"/>
@@ -6322,11 +6303,7 @@
             </a:r>
             <a:r>
               <a:rPr lang="en-GB" dirty="0" smtClean="0"/>
-              <a:t> (Trial Data</a:t>
-            </a:r>
-            <a:r>
-              <a:rPr lang="en-GB" dirty="0" smtClean="0"/>
-              <a:t>)</a:t>
+              <a:t> (Trial Data)</a:t>
             </a:r>
           </a:p>
           <a:p>
@@ -6464,7 +6441,7 @@
         </p:nvCxnSpPr>
         <p:spPr>
           <a:xfrm>
-            <a:off x="4469583" y="4222875"/>
+            <a:off x="4469583" y="3956864"/>
             <a:ext cx="0" cy="457200"/>
           </a:xfrm>
           <a:prstGeom prst="straightConnector1">
@@ -6500,7 +6477,7 @@
         </p:nvSpPr>
         <p:spPr>
           <a:xfrm>
-            <a:off x="3783783" y="4749002"/>
+            <a:off x="3783783" y="4482991"/>
             <a:ext cx="1371600" cy="623454"/>
           </a:xfrm>
           <a:prstGeom prst="rect">
@@ -6550,7 +6527,7 @@
         </p:nvSpPr>
         <p:spPr>
           <a:xfrm>
-            <a:off x="3783783" y="5498220"/>
+            <a:off x="3783783" y="5232209"/>
             <a:ext cx="1371600" cy="1035583"/>
           </a:xfrm>
           <a:prstGeom prst="rect">
@@ -6598,7 +6575,6 @@
               <a:rPr lang="en-GB" sz="1400" dirty="0" smtClean="0"/>
               <a:t>Field layout</a:t>
             </a:r>
-            <a:endParaRPr lang="en-GB" sz="1400" dirty="0" smtClean="0"/>
           </a:p>
           <a:p>
             <a:pPr marL="285750" indent="-285750">
@@ -6609,7 +6585,6 @@
               <a:rPr lang="en-GB" sz="1400" dirty="0" smtClean="0"/>
               <a:t>Map</a:t>
             </a:r>
-            <a:endParaRPr lang="en-GB" sz="1400" dirty="0" smtClean="0"/>
           </a:p>
         </p:txBody>
       </p:sp>
@@ -6900,13 +6875,8 @@
             </a:pPr>
             <a:r>
               <a:rPr lang="en-GB" sz="1400" dirty="0" smtClean="0"/>
-              <a:t>Main </a:t>
-            </a:r>
-            <a:r>
-              <a:rPr lang="en-GB" sz="1400" dirty="0" smtClean="0"/>
-              <a:t>modelling</a:t>
-            </a:r>
-            <a:endParaRPr lang="en-GB" sz="1400" dirty="0" smtClean="0"/>
+              <a:t>Main modelling</a:t>
+            </a:r>
           </a:p>
           <a:p>
             <a:pPr marL="285750" indent="-285750">
@@ -6958,11 +6928,7 @@
             </a:pPr>
             <a:r>
               <a:rPr lang="en-GB" sz="1400" dirty="0" smtClean="0"/>
-              <a:t>Exact model depends on design and </a:t>
-            </a:r>
-            <a:r>
-              <a:rPr lang="en-GB" sz="1400" dirty="0" smtClean="0"/>
-              <a:t>options</a:t>
+              <a:t>Exact model depends on design and options</a:t>
             </a:r>
           </a:p>
           <a:p>
@@ -6974,7 +6940,6 @@
               <a:rPr lang="en-GB" sz="1400" dirty="0" smtClean="0"/>
               <a:t>1 or more trials</a:t>
             </a:r>
-            <a:endParaRPr lang="en-GB" sz="1400" dirty="0" smtClean="0"/>
           </a:p>
           <a:p>
             <a:pPr marL="285750" indent="-285750">
@@ -7469,11 +7434,7 @@
             </a:pPr>
             <a:r>
               <a:rPr lang="en-GB" sz="1400" dirty="0" smtClean="0"/>
-              <a:t>1 </a:t>
-            </a:r>
-            <a:r>
-              <a:rPr lang="en-GB" sz="1400" dirty="0" smtClean="0"/>
-              <a:t>or more traits</a:t>
+              <a:t>1 or more traits</a:t>
             </a:r>
             <a:endParaRPr lang="en-GB" sz="1400" dirty="0"/>
           </a:p>
@@ -7524,7 +7485,7 @@
         <p:spPr>
           <a:xfrm>
             <a:off x="3783783" y="2891136"/>
-            <a:ext cx="1371600" cy="1307640"/>
+            <a:ext cx="1371600" cy="1032471"/>
           </a:xfrm>
           <a:prstGeom prst="rect">
             <a:avLst/>
@@ -7555,7 +7516,7 @@
                   <a:srgbClr val="0070C0"/>
                 </a:solidFill>
               </a:rPr>
-              <a:t>getMeta</a:t>
+              <a:t>addTD</a:t>
             </a:r>
             <a:endParaRPr lang="en-GB" dirty="0" smtClean="0">
               <a:solidFill>
@@ -7571,7 +7532,7 @@
                   <a:srgbClr val="0070C0"/>
                 </a:solidFill>
               </a:rPr>
-              <a:t>setMeta</a:t>
+              <a:t>dropTD</a:t>
             </a:r>
             <a:endParaRPr lang="en-GB" dirty="0" smtClean="0">
               <a:solidFill>
@@ -7593,15 +7554,7 @@
                   <a:schemeClr val="tx1"/>
                 </a:solidFill>
               </a:rPr>
-              <a:t>get/set metadata as </a:t>
-            </a:r>
-            <a:r>
-              <a:rPr lang="en-GB" sz="1200" dirty="0" err="1" smtClean="0">
-                <a:solidFill>
-                  <a:schemeClr val="tx1"/>
-                </a:solidFill>
-              </a:rPr>
-              <a:t>dataframe</a:t>
+              <a:t>Add or drop trials</a:t>
             </a:r>
             <a:endParaRPr lang="en-GB" sz="1200" dirty="0">
               <a:solidFill>
@@ -7683,6 +7636,102 @@
           </a:fontRef>
         </p:style>
       </p:cxnSp>
+      <p:sp>
+        <p:nvSpPr>
+          <p:cNvPr id="26" name="Rectangle 25"/>
+          <p:cNvSpPr/>
+          <p:nvPr/>
+        </p:nvSpPr>
+        <p:spPr>
+          <a:xfrm>
+            <a:off x="2207469" y="4026255"/>
+            <a:ext cx="1371600" cy="1307640"/>
+          </a:xfrm>
+          <a:prstGeom prst="rect">
+            <a:avLst/>
+          </a:prstGeom>
+        </p:spPr>
+        <p:style>
+          <a:lnRef idx="2">
+            <a:schemeClr val="dk1"/>
+          </a:lnRef>
+          <a:fillRef idx="1">
+            <a:schemeClr val="lt1"/>
+          </a:fillRef>
+          <a:effectRef idx="0">
+            <a:schemeClr val="dk1"/>
+          </a:effectRef>
+          <a:fontRef idx="minor">
+            <a:schemeClr val="dk1"/>
+          </a:fontRef>
+        </p:style>
+        <p:txBody>
+          <a:bodyPr rtlCol="0" anchor="ctr"/>
+          <a:lstStyle/>
+          <a:p>
+            <a:pPr algn="ctr"/>
+            <a:r>
+              <a:rPr lang="en-GB" dirty="0" err="1" smtClean="0">
+                <a:solidFill>
+                  <a:srgbClr val="0070C0"/>
+                </a:solidFill>
+              </a:rPr>
+              <a:t>getMeta</a:t>
+            </a:r>
+            <a:endParaRPr lang="en-GB" dirty="0" smtClean="0">
+              <a:solidFill>
+                <a:srgbClr val="0070C0"/>
+              </a:solidFill>
+            </a:endParaRPr>
+          </a:p>
+          <a:p>
+            <a:pPr algn="ctr"/>
+            <a:r>
+              <a:rPr lang="en-GB" dirty="0" err="1" smtClean="0">
+                <a:solidFill>
+                  <a:srgbClr val="0070C0"/>
+                </a:solidFill>
+              </a:rPr>
+              <a:t>setMeta</a:t>
+            </a:r>
+            <a:endParaRPr lang="en-GB" dirty="0" smtClean="0">
+              <a:solidFill>
+                <a:srgbClr val="0070C0"/>
+              </a:solidFill>
+            </a:endParaRPr>
+          </a:p>
+          <a:p>
+            <a:endParaRPr lang="en-GB" sz="1200" dirty="0" smtClean="0">
+              <a:solidFill>
+                <a:schemeClr val="tx1"/>
+              </a:solidFill>
+            </a:endParaRPr>
+          </a:p>
+          <a:p>
+            <a:r>
+              <a:rPr lang="en-GB" sz="1200" dirty="0" smtClean="0">
+                <a:solidFill>
+                  <a:schemeClr val="tx1"/>
+                </a:solidFill>
+              </a:rPr>
+              <a:t>get/set metadata as </a:t>
+            </a:r>
+            <a:r>
+              <a:rPr lang="en-GB" sz="1200" dirty="0" err="1" smtClean="0">
+                <a:solidFill>
+                  <a:schemeClr val="tx1"/>
+                </a:solidFill>
+              </a:rPr>
+              <a:t>dataframe</a:t>
+            </a:r>
+            <a:endParaRPr lang="en-GB" sz="1200" dirty="0">
+              <a:solidFill>
+                <a:schemeClr val="tx1"/>
+              </a:solidFill>
+            </a:endParaRPr>
+          </a:p>
+        </p:txBody>
+      </p:sp>
     </p:spTree>
     <p:extLst>
       <p:ext uri="{BB962C8B-B14F-4D97-AF65-F5344CB8AC3E}">

</xml_diff>

<commit_message>
Solved problem in qtlPosToName caused by presence of X chromosome and map positions with digits in it
</commit_message>
<xml_diff>
--- a/vignettes/RAPoverview.pptx
+++ b/vignettes/RAPoverview.pptx
@@ -255,7 +255,7 @@
           <a:p>
             <a:fld id="{9FABA390-D603-4FE1-BC20-34078821C5FB}" type="datetimeFigureOut">
               <a:rPr lang="en-GB" smtClean="0"/>
-              <a:t>29/03/2018</a:t>
+              <a:t>30/03/2018</a:t>
             </a:fld>
             <a:endParaRPr lang="en-GB"/>
           </a:p>
@@ -425,7 +425,7 @@
           <a:p>
             <a:fld id="{9FABA390-D603-4FE1-BC20-34078821C5FB}" type="datetimeFigureOut">
               <a:rPr lang="en-GB" smtClean="0"/>
-              <a:t>29/03/2018</a:t>
+              <a:t>30/03/2018</a:t>
             </a:fld>
             <a:endParaRPr lang="en-GB"/>
           </a:p>
@@ -605,7 +605,7 @@
           <a:p>
             <a:fld id="{9FABA390-D603-4FE1-BC20-34078821C5FB}" type="datetimeFigureOut">
               <a:rPr lang="en-GB" smtClean="0"/>
-              <a:t>29/03/2018</a:t>
+              <a:t>30/03/2018</a:t>
             </a:fld>
             <a:endParaRPr lang="en-GB"/>
           </a:p>
@@ -775,7 +775,7 @@
           <a:p>
             <a:fld id="{9FABA390-D603-4FE1-BC20-34078821C5FB}" type="datetimeFigureOut">
               <a:rPr lang="en-GB" smtClean="0"/>
-              <a:t>29/03/2018</a:t>
+              <a:t>30/03/2018</a:t>
             </a:fld>
             <a:endParaRPr lang="en-GB"/>
           </a:p>
@@ -1021,7 +1021,7 @@
           <a:p>
             <a:fld id="{9FABA390-D603-4FE1-BC20-34078821C5FB}" type="datetimeFigureOut">
               <a:rPr lang="en-GB" smtClean="0"/>
-              <a:t>29/03/2018</a:t>
+              <a:t>30/03/2018</a:t>
             </a:fld>
             <a:endParaRPr lang="en-GB"/>
           </a:p>
@@ -1253,7 +1253,7 @@
           <a:p>
             <a:fld id="{9FABA390-D603-4FE1-BC20-34078821C5FB}" type="datetimeFigureOut">
               <a:rPr lang="en-GB" smtClean="0"/>
-              <a:t>29/03/2018</a:t>
+              <a:t>30/03/2018</a:t>
             </a:fld>
             <a:endParaRPr lang="en-GB"/>
           </a:p>
@@ -1620,7 +1620,7 @@
           <a:p>
             <a:fld id="{9FABA390-D603-4FE1-BC20-34078821C5FB}" type="datetimeFigureOut">
               <a:rPr lang="en-GB" smtClean="0"/>
-              <a:t>29/03/2018</a:t>
+              <a:t>30/03/2018</a:t>
             </a:fld>
             <a:endParaRPr lang="en-GB"/>
           </a:p>
@@ -1738,7 +1738,7 @@
           <a:p>
             <a:fld id="{9FABA390-D603-4FE1-BC20-34078821C5FB}" type="datetimeFigureOut">
               <a:rPr lang="en-GB" smtClean="0"/>
-              <a:t>29/03/2018</a:t>
+              <a:t>30/03/2018</a:t>
             </a:fld>
             <a:endParaRPr lang="en-GB"/>
           </a:p>
@@ -1833,7 +1833,7 @@
           <a:p>
             <a:fld id="{9FABA390-D603-4FE1-BC20-34078821C5FB}" type="datetimeFigureOut">
               <a:rPr lang="en-GB" smtClean="0"/>
-              <a:t>29/03/2018</a:t>
+              <a:t>30/03/2018</a:t>
             </a:fld>
             <a:endParaRPr lang="en-GB"/>
           </a:p>
@@ -2110,7 +2110,7 @@
           <a:p>
             <a:fld id="{9FABA390-D603-4FE1-BC20-34078821C5FB}" type="datetimeFigureOut">
               <a:rPr lang="en-GB" smtClean="0"/>
-              <a:t>29/03/2018</a:t>
+              <a:t>30/03/2018</a:t>
             </a:fld>
             <a:endParaRPr lang="en-GB"/>
           </a:p>
@@ -2363,7 +2363,7 @@
           <a:p>
             <a:fld id="{9FABA390-D603-4FE1-BC20-34078821C5FB}" type="datetimeFigureOut">
               <a:rPr lang="en-GB" smtClean="0"/>
-              <a:t>29/03/2018</a:t>
+              <a:t>30/03/2018</a:t>
             </a:fld>
             <a:endParaRPr lang="en-GB"/>
           </a:p>
@@ -2576,7 +2576,7 @@
           <a:p>
             <a:fld id="{9FABA390-D603-4FE1-BC20-34078821C5FB}" type="datetimeFigureOut">
               <a:rPr lang="en-GB" smtClean="0"/>
-              <a:t>29/03/2018</a:t>
+              <a:t>30/03/2018</a:t>
             </a:fld>
             <a:endParaRPr lang="en-GB"/>
           </a:p>
@@ -5921,8 +5921,39 @@
           <a:p>
             <a:r>
               <a:rPr lang="en-GB" sz="1400" dirty="0" smtClean="0"/>
-              <a:t>Is the metadata complete as it is now or should more items be added – suggestions: altitude</a:t>
-            </a:r>
+              <a:t>Is the metadata complete as it is now or should more items be added – suggestions: </a:t>
+            </a:r>
+            <a:r>
+              <a:rPr lang="en-GB" sz="1400" dirty="0" smtClean="0"/>
+              <a:t>altitude</a:t>
+            </a:r>
+          </a:p>
+          <a:p>
+            <a:r>
+              <a:rPr lang="en-GB" sz="1400" dirty="0" smtClean="0"/>
+              <a:t>For the </a:t>
+            </a:r>
+            <a:r>
+              <a:rPr lang="en-GB" sz="1400" dirty="0" err="1" smtClean="0"/>
+              <a:t>qtl</a:t>
+            </a:r>
+            <a:r>
+              <a:rPr lang="en-GB" sz="1400" dirty="0" smtClean="0"/>
+              <a:t> part the package relies heavily on the </a:t>
+            </a:r>
+            <a:r>
+              <a:rPr lang="en-GB" sz="1400" dirty="0" err="1" smtClean="0"/>
+              <a:t>qtl</a:t>
+            </a:r>
+            <a:r>
+              <a:rPr lang="en-GB" sz="1400" dirty="0" smtClean="0"/>
+              <a:t> package. Should we contact the author of the package </a:t>
+            </a:r>
+            <a:r>
+              <a:rPr lang="en-GB" sz="1400" smtClean="0"/>
+              <a:t>about this?</a:t>
+            </a:r>
+            <a:endParaRPr lang="en-GB" sz="1400" dirty="0" smtClean="0"/>
           </a:p>
           <a:p>
             <a:endParaRPr lang="en-GB" sz="1400" dirty="0"/>

</xml_diff>